<commit_message>
Gefühlte Temperatur Präsi einfügen
</commit_message>
<xml_diff>
--- a/Abschlusspräsentation.pptx
+++ b/Abschlusspräsentation.pptx
@@ -4266,10 +4266,10 @@
       </p:sp>
       <p:pic>
         <p:nvPicPr>
-          <p:cNvPr id="9" name="Inhaltsplatzhalter 8">
-            <a:extLst>
-              <a:ext uri="{FF2B5EF4-FFF2-40B4-BE49-F238E27FC236}">
-                <a16:creationId xmlns:a16="http://schemas.microsoft.com/office/drawing/2014/main" id="{72C7E747-D1F6-48EF-A18A-02C2518C65D4}"/>
+          <p:cNvPr id="11" name="Inhaltsplatzhalter 10">
+            <a:extLst>
+              <a:ext uri="{FF2B5EF4-FFF2-40B4-BE49-F238E27FC236}">
+                <a16:creationId xmlns:a16="http://schemas.microsoft.com/office/drawing/2014/main" id="{11AB3D79-9A78-4A7E-9BA4-9A18B27F628A}"/>
               </a:ext>
             </a:extLst>
           </p:cNvPr>
@@ -4277,11 +4277,46 @@
             <a:picLocks noGrp="1" noChangeAspect="1"/>
           </p:cNvPicPr>
           <p:nvPr>
-            <p:ph sz="half" idx="2"/>
+            <p:ph sz="quarter" idx="4"/>
           </p:nvPr>
         </p:nvPicPr>
         <p:blipFill>
           <a:blip r:embed="rId2">
+            <a:extLst>
+              <a:ext uri="{28A0092B-C50C-407E-A947-70E740481C1C}">
+                <a14:useLocalDpi xmlns:a14="http://schemas.microsoft.com/office/drawing/2010/main" val="0"/>
+              </a:ext>
+            </a:extLst>
+          </a:blip>
+          <a:stretch>
+            <a:fillRect/>
+          </a:stretch>
+        </p:blipFill>
+        <p:spPr>
+          <a:xfrm>
+            <a:off x="6921500" y="2505075"/>
+            <a:ext cx="3684588" cy="3684588"/>
+          </a:xfrm>
+        </p:spPr>
+      </p:pic>
+      <p:pic>
+        <p:nvPicPr>
+          <p:cNvPr id="6" name="Inhaltsplatzhalter 5" descr="Ein Bild, das Foto, klein, sitzend, orange enthält.&#10;&#10;Automatisch generierte Beschreibung">
+            <a:extLst>
+              <a:ext uri="{FF2B5EF4-FFF2-40B4-BE49-F238E27FC236}">
+                <a16:creationId xmlns:a16="http://schemas.microsoft.com/office/drawing/2014/main" id="{A6EC9D13-033C-4895-A920-BA8222DC5DBD}"/>
+              </a:ext>
+            </a:extLst>
+          </p:cNvPr>
+          <p:cNvPicPr>
+            <a:picLocks noGrp="1" noChangeAspect="1"/>
+          </p:cNvPicPr>
+          <p:nvPr>
+            <p:ph sz="half" idx="2"/>
+          </p:nvPr>
+        </p:nvPicPr>
+        <p:blipFill>
+          <a:blip r:embed="rId3">
             <a:extLst>
               <a:ext uri="{28A0092B-C50C-407E-A947-70E740481C1C}">
                 <a14:useLocalDpi xmlns:a14="http://schemas.microsoft.com/office/drawing/2010/main" val="0"/>
@@ -4295,41 +4330,6 @@
         <p:spPr>
           <a:xfrm>
             <a:off x="1576387" y="2505075"/>
-            <a:ext cx="3684588" cy="3684588"/>
-          </a:xfrm>
-        </p:spPr>
-      </p:pic>
-      <p:pic>
-        <p:nvPicPr>
-          <p:cNvPr id="11" name="Inhaltsplatzhalter 10">
-            <a:extLst>
-              <a:ext uri="{FF2B5EF4-FFF2-40B4-BE49-F238E27FC236}">
-                <a16:creationId xmlns:a16="http://schemas.microsoft.com/office/drawing/2014/main" id="{11AB3D79-9A78-4A7E-9BA4-9A18B27F628A}"/>
-              </a:ext>
-            </a:extLst>
-          </p:cNvPr>
-          <p:cNvPicPr>
-            <a:picLocks noGrp="1" noChangeAspect="1"/>
-          </p:cNvPicPr>
-          <p:nvPr>
-            <p:ph sz="quarter" idx="4"/>
-          </p:nvPr>
-        </p:nvPicPr>
-        <p:blipFill>
-          <a:blip r:embed="rId2">
-            <a:extLst>
-              <a:ext uri="{28A0092B-C50C-407E-A947-70E740481C1C}">
-                <a14:useLocalDpi xmlns:a14="http://schemas.microsoft.com/office/drawing/2010/main" val="0"/>
-              </a:ext>
-            </a:extLst>
-          </a:blip>
-          <a:stretch>
-            <a:fillRect/>
-          </a:stretch>
-        </p:blipFill>
-        <p:spPr>
-          <a:xfrm>
-            <a:off x="6921500" y="2505075"/>
             <a:ext cx="3684588" cy="3684588"/>
           </a:xfrm>
         </p:spPr>

</xml_diff>